<commit_message>
update image in slides
</commit_message>
<xml_diff>
--- a/WDS/Whiteboard design session trainer presentation - Containers and DevOps.pptx
+++ b/WDS/Whiteboard design session trainer presentation - Containers and DevOps.pptx
@@ -221,7 +221,7 @@
           <a:p>
             <a:fld id="{52A13B17-C506-4D51-BB37-16B365906619}" type="datetimeFigureOut">
               <a:rPr lang="en-US" smtClean="0"/>
-              <a:t>6/12/2018</a:t>
+              <a:t>6/27/2018</a:t>
             </a:fld>
             <a:endParaRPr lang="en-US"/>
           </a:p>
@@ -2177,7 +2177,7 @@
                   <a:prstClr val="black"/>
                 </a:solidFill>
               </a:rPr>
-              <a:t>6/12/2018 1:46 PM</a:t>
+              <a:t>6/27/2018 8:04 PM</a:t>
             </a:fld>
             <a:endParaRPr lang="en-US" dirty="0">
               <a:solidFill>
@@ -17695,10 +17695,10 @@
       </p:sp>
       <p:pic>
         <p:nvPicPr>
-          <p:cNvPr id="3" name="Picture 2" descr="The solution will use Azure Kubernetes Service (AKS). The proposed containers deployed to the cluster are illustrated in this diagram, with MongoDB remaining as a managed service.">
+          <p:cNvPr id="4" name="Picture 3">
             <a:extLst>
               <a:ext uri="{FF2B5EF4-FFF2-40B4-BE49-F238E27FC236}">
-                <a16:creationId xmlns:a16="http://schemas.microsoft.com/office/drawing/2014/main" id="{EB49DCF4-123B-4467-971B-3222F81D9810}"/>
+                <a16:creationId xmlns:a16="http://schemas.microsoft.com/office/drawing/2014/main" id="{A77DE13A-AD2C-4759-A6A4-111012127BDB}"/>
               </a:ext>
             </a:extLst>
           </p:cNvPr>
@@ -17715,8 +17715,8 @@
         </p:blipFill>
         <p:spPr>
           <a:xfrm>
-            <a:off x="1686187" y="1189176"/>
-            <a:ext cx="9468697" cy="5443207"/>
+            <a:off x="1715911" y="1369575"/>
+            <a:ext cx="9014287" cy="5352957"/>
           </a:xfrm>
           <a:prstGeom prst="rect">
             <a:avLst/>
@@ -20202,15 +20202,6 @@
 </file>
 
 <file path=customXml/item1.xml><?xml version="1.0" encoding="utf-8"?>
-<?mso-contentType ?>
-<FormTemplates xmlns="http://schemas.microsoft.com/sharepoint/v3/contenttype/forms">
-  <Display>DocumentLibraryForm</Display>
-  <Edit>DocumentLibraryForm</Edit>
-  <New>DocumentLibraryForm</New>
-</FormTemplates>
-</file>
-
-<file path=customXml/item2.xml><?xml version="1.0" encoding="utf-8"?>
 <ct:contentTypeSchema xmlns:ct="http://schemas.microsoft.com/office/2006/metadata/contentType" xmlns:ma="http://schemas.microsoft.com/office/2006/metadata/properties/metaAttributes" ct:_="" ma:_="" ma:contentTypeName="Document" ma:contentTypeID="0x010100D15DFA3690A15B4081582BBCC6BEAC3E" ma:contentTypeVersion="9" ma:contentTypeDescription="Create a new document." ma:contentTypeScope="" ma:versionID="642da1784587cbe85a7fdbbe4dc36103">
   <xsd:schema xmlns:xsd="http://www.w3.org/2001/XMLSchema" xmlns:xs="http://www.w3.org/2001/XMLSchema" xmlns:p="http://schemas.microsoft.com/office/2006/metadata/properties" xmlns:ns1="http://schemas.microsoft.com/sharepoint/v3" xmlns:ns2="2023ac63-7b75-4916-a9ee-591457758eee" xmlns:ns3="d9c797ad-d7c3-4982-82b7-81352a75e4a5" targetNamespace="http://schemas.microsoft.com/office/2006/metadata/properties" ma:root="true" ma:fieldsID="91198b0246576053cc55dd2c67035a89" ns1:_="" ns2:_="" ns3:_="">
     <xsd:import namespace="http://schemas.microsoft.com/sharepoint/v3"/>
@@ -20412,6 +20403,15 @@
 </ct:contentTypeSchema>
 </file>
 
+<file path=customXml/item2.xml><?xml version="1.0" encoding="utf-8"?>
+<?mso-contentType ?>
+<FormTemplates xmlns="http://schemas.microsoft.com/sharepoint/v3/contenttype/forms">
+  <Display>DocumentLibraryForm</Display>
+  <Edit>DocumentLibraryForm</Edit>
+  <New>DocumentLibraryForm</New>
+</FormTemplates>
+</file>
+
 <file path=customXml/item3.xml><?xml version="1.0" encoding="utf-8"?>
 <p:properties xmlns:p="http://schemas.microsoft.com/office/2006/metadata/properties" xmlns:xsi="http://www.w3.org/2001/XMLSchema-instance" xmlns:pc="http://schemas.microsoft.com/office/infopath/2007/PartnerControls">
   <documentManagement>
@@ -20422,14 +20422,6 @@
 </file>
 
 <file path=customXml/itemProps1.xml><?xml version="1.0" encoding="utf-8"?>
-<ds:datastoreItem xmlns:ds="http://schemas.openxmlformats.org/officeDocument/2006/customXml" ds:itemID="{158EBE6C-F96B-4BB0-A894-BE91EDC32CEB}">
-  <ds:schemaRefs>
-    <ds:schemaRef ds:uri="http://schemas.microsoft.com/sharepoint/v3/contenttype/forms"/>
-  </ds:schemaRefs>
-</ds:datastoreItem>
-</file>
-
-<file path=customXml/itemProps2.xml><?xml version="1.0" encoding="utf-8"?>
 <ds:datastoreItem xmlns:ds="http://schemas.openxmlformats.org/officeDocument/2006/customXml" ds:itemID="{7739C07D-175D-4795-BC78-2FBA4DE737F8}">
   <ds:schemaRefs>
     <ds:schemaRef ds:uri="http://schemas.microsoft.com/office/2006/metadata/contentType"/>
@@ -20445,6 +20437,14 @@
     <ds:schemaRef ds:uri="http://purl.org/dc/elements/1.1/"/>
     <ds:schemaRef ds:uri="http://purl.org/dc/terms/"/>
     <ds:schemaRef ds:uri="http://schemas.microsoft.com/internal/obd"/>
+  </ds:schemaRefs>
+</ds:datastoreItem>
+</file>
+
+<file path=customXml/itemProps2.xml><?xml version="1.0" encoding="utf-8"?>
+<ds:datastoreItem xmlns:ds="http://schemas.openxmlformats.org/officeDocument/2006/customXml" ds:itemID="{158EBE6C-F96B-4BB0-A894-BE91EDC32CEB}">
+  <ds:schemaRefs>
+    <ds:schemaRef ds:uri="http://schemas.microsoft.com/sharepoint/v3/contenttype/forms"/>
   </ds:schemaRefs>
 </ds:datastoreItem>
 </file>

</xml_diff>